<commit_message>
final report group 21_modify
</commit_message>
<xml_diff>
--- a/M10703430/第二十一組_期末報告.pptx
+++ b/M10703430/第二十一組_期末報告.pptx
@@ -5,10 +5,10 @@
     <p:sldMasterId id="2147483755" r:id="rId1"/>
   </p:sldMasterIdLst>
   <p:notesMasterIdLst>
-    <p:notesMasterId r:id="rId11"/>
+    <p:notesMasterId r:id="rId12"/>
   </p:notesMasterIdLst>
   <p:handoutMasterIdLst>
-    <p:handoutMasterId r:id="rId12"/>
+    <p:handoutMasterId r:id="rId13"/>
   </p:handoutMasterIdLst>
   <p:sldIdLst>
     <p:sldId id="256" r:id="rId2"/>
@@ -20,6 +20,7 @@
     <p:sldId id="265" r:id="rId8"/>
     <p:sldId id="288" r:id="rId9"/>
     <p:sldId id="289" r:id="rId10"/>
+    <p:sldId id="295" r:id="rId11"/>
   </p:sldIdLst>
   <p:sldSz cx="12188825" cy="6858000"/>
   <p:notesSz cx="6858000" cy="9144000"/>
@@ -241,7 +242,7 @@
                 <a:latin typeface="Microsoft JhengHei UI" panose="020B0604030504040204" pitchFamily="34" charset="-120"/>
                 <a:ea typeface="Microsoft JhengHei UI" panose="020B0604030504040204" pitchFamily="34" charset="-120"/>
               </a:rPr>
-              <a:t>2019/6/10</a:t>
+              <a:t>2019/6/11</a:t>
             </a:fld>
             <a:endParaRPr lang="zh-TW" altLang="en-US" dirty="0">
               <a:latin typeface="Microsoft JhengHei UI" panose="020B0604030504040204" pitchFamily="34" charset="-120"/>
@@ -428,7 +429,7 @@
             <a:fld id="{8C3DF527-CB9F-4451-8853-A61312AC4F28}" type="datetime1">
               <a:rPr lang="zh-TW" altLang="en-US" smtClean="0"/>
               <a:pPr/>
-              <a:t>2019/6/10</a:t>
+              <a:t>2019/6/11</a:t>
             </a:fld>
             <a:endParaRPr lang="zh-TW" altLang="en-US" dirty="0"/>
           </a:p>
@@ -987,7 +988,7 @@
           <a:p>
             <a:fld id="{7589E56E-42C2-4E97-8112-DE797D0A7C24}" type="datetime1">
               <a:rPr lang="zh-TW" altLang="en-US" smtClean="0"/>
-              <a:t>2019/6/10</a:t>
+              <a:t>2019/6/11</a:t>
             </a:fld>
             <a:endParaRPr lang="zh-TW" altLang="en-US" dirty="0"/>
           </a:p>
@@ -1171,7 +1172,7 @@
           <a:p>
             <a:fld id="{7589E56E-42C2-4E97-8112-DE797D0A7C24}" type="datetime1">
               <a:rPr lang="zh-TW" altLang="en-US" smtClean="0"/>
-              <a:t>2019/6/10</a:t>
+              <a:t>2019/6/11</a:t>
             </a:fld>
             <a:endParaRPr lang="zh-TW" altLang="en-US" dirty="0"/>
           </a:p>
@@ -1365,7 +1366,7 @@
           <a:p>
             <a:fld id="{7589E56E-42C2-4E97-8112-DE797D0A7C24}" type="datetime1">
               <a:rPr lang="zh-TW" altLang="en-US" smtClean="0"/>
-              <a:t>2019/6/10</a:t>
+              <a:t>2019/6/11</a:t>
             </a:fld>
             <a:endParaRPr lang="zh-TW" altLang="en-US" dirty="0"/>
           </a:p>
@@ -10931,7 +10932,7 @@
             <a:fld id="{66661F67-92FC-487A-8910-F31C817AFA41}" type="datetime1">
               <a:rPr lang="zh-TW" altLang="en-US" smtClean="0"/>
               <a:pPr/>
-              <a:t>2019/6/10</a:t>
+              <a:t>2019/6/11</a:t>
             </a:fld>
             <a:endParaRPr lang="zh-TW" altLang="en-US" dirty="0"/>
           </a:p>
@@ -11250,7 +11251,7 @@
           <a:p>
             <a:fld id="{7589E56E-42C2-4E97-8112-DE797D0A7C24}" type="datetime1">
               <a:rPr lang="zh-TW" altLang="en-US" smtClean="0"/>
-              <a:t>2019/6/10</a:t>
+              <a:t>2019/6/11</a:t>
             </a:fld>
             <a:endParaRPr lang="zh-TW" altLang="en-US" dirty="0"/>
           </a:p>
@@ -11510,7 +11511,7 @@
           <a:p>
             <a:fld id="{7589E56E-42C2-4E97-8112-DE797D0A7C24}" type="datetime1">
               <a:rPr lang="zh-TW" altLang="en-US" smtClean="0"/>
-              <a:t>2019/6/10</a:t>
+              <a:t>2019/6/11</a:t>
             </a:fld>
             <a:endParaRPr lang="zh-TW" altLang="en-US" dirty="0"/>
           </a:p>
@@ -11812,7 +11813,7 @@
           <a:p>
             <a:fld id="{7589E56E-42C2-4E97-8112-DE797D0A7C24}" type="datetime1">
               <a:rPr lang="zh-TW" altLang="en-US" smtClean="0"/>
-              <a:t>2019/6/10</a:t>
+              <a:t>2019/6/11</a:t>
             </a:fld>
             <a:endParaRPr lang="zh-TW" altLang="en-US" dirty="0"/>
           </a:p>
@@ -12254,7 +12255,7 @@
             <a:fld id="{66661F67-92FC-487A-8910-F31C817AFA41}" type="datetime1">
               <a:rPr lang="zh-TW" altLang="en-US" smtClean="0"/>
               <a:pPr/>
-              <a:t>2019/6/10</a:t>
+              <a:t>2019/6/11</a:t>
             </a:fld>
             <a:endParaRPr lang="zh-TW" altLang="en-US" dirty="0"/>
           </a:p>
@@ -12398,7 +12399,7 @@
             <a:fld id="{EF82FDFD-18A2-4FA7-913D-8D2BA1111367}" type="datetime1">
               <a:rPr lang="zh-TW" altLang="en-US" smtClean="0"/>
               <a:pPr/>
-              <a:t>2019/6/10</a:t>
+              <a:t>2019/6/11</a:t>
             </a:fld>
             <a:endParaRPr lang="zh-TW" altLang="en-US" dirty="0"/>
           </a:p>
@@ -12519,7 +12520,7 @@
             <a:pPr rtl="0"/>
             <a:fld id="{29161E1E-59DD-4B90-931A-B39E9CA0383F}" type="datetime1">
               <a:rPr lang="zh-TW" altLang="en-US" smtClean="0"/>
-              <a:t>2019/6/10</a:t>
+              <a:t>2019/6/11</a:t>
             </a:fld>
             <a:endParaRPr lang="zh-TW" altLang="en-US" dirty="0"/>
           </a:p>
@@ -12822,7 +12823,7 @@
           <a:p>
             <a:fld id="{7589E56E-42C2-4E97-8112-DE797D0A7C24}" type="datetime1">
               <a:rPr lang="zh-TW" altLang="en-US" smtClean="0"/>
-              <a:t>2019/6/10</a:t>
+              <a:t>2019/6/11</a:t>
             </a:fld>
             <a:endParaRPr lang="zh-TW" altLang="en-US" dirty="0"/>
           </a:p>
@@ -13096,7 +13097,7 @@
           <a:p>
             <a:fld id="{7589E56E-42C2-4E97-8112-DE797D0A7C24}" type="datetime1">
               <a:rPr lang="zh-TW" altLang="en-US" smtClean="0"/>
-              <a:t>2019/6/10</a:t>
+              <a:t>2019/6/11</a:t>
             </a:fld>
             <a:endParaRPr lang="zh-TW" altLang="en-US" dirty="0"/>
           </a:p>
@@ -13379,7 +13380,7 @@
           <a:p>
             <a:fld id="{7589E56E-42C2-4E97-8112-DE797D0A7C24}" type="datetime1">
               <a:rPr lang="zh-TW" altLang="en-US" smtClean="0"/>
-              <a:t>2019/6/10</a:t>
+              <a:t>2019/6/11</a:t>
             </a:fld>
             <a:endParaRPr lang="zh-TW" altLang="en-US" dirty="0"/>
           </a:p>
@@ -14176,6 +14177,123 @@
       </p:transition>
     </mc:Fallback>
   </mc:AlternateContent>
+</p:sld>
+</file>
+
+<file path=ppt/slides/slide10.xml><?xml version="1.0" encoding="utf-8"?>
+<p:sld xmlns:a="http://schemas.openxmlformats.org/drawingml/2006/main" xmlns:r="http://schemas.openxmlformats.org/officeDocument/2006/relationships" xmlns:p="http://schemas.openxmlformats.org/presentationml/2006/main">
+  <p:cSld>
+    <p:spTree>
+      <p:nvGrpSpPr>
+        <p:cNvPr id="1" name=""/>
+        <p:cNvGrpSpPr/>
+        <p:nvPr/>
+      </p:nvGrpSpPr>
+      <p:grpSpPr>
+        <a:xfrm>
+          <a:off x="0" y="0"/>
+          <a:ext cx="0" cy="0"/>
+          <a:chOff x="0" y="0"/>
+          <a:chExt cx="0" cy="0"/>
+        </a:xfrm>
+      </p:grpSpPr>
+      <p:sp>
+        <p:nvSpPr>
+          <p:cNvPr id="2" name="標題 1">
+            <a:extLst>
+              <a:ext uri="{FF2B5EF4-FFF2-40B4-BE49-F238E27FC236}">
+                <a16:creationId xmlns:a16="http://schemas.microsoft.com/office/drawing/2014/main" id="{57A5C558-50C8-445B-9998-F70245550029}"/>
+              </a:ext>
+            </a:extLst>
+          </p:cNvPr>
+          <p:cNvSpPr>
+            <a:spLocks noGrp="1"/>
+          </p:cNvSpPr>
+          <p:nvPr>
+            <p:ph type="title"/>
+          </p:nvPr>
+        </p:nvSpPr>
+        <p:spPr/>
+        <p:txBody>
+          <a:bodyPr/>
+          <a:lstStyle/>
+          <a:p>
+            <a:r>
+              <a:rPr lang="zh-TW" altLang="en-US" dirty="0"/>
+              <a:t>參賽心得</a:t>
+            </a:r>
+          </a:p>
+        </p:txBody>
+      </p:sp>
+      <p:sp>
+        <p:nvSpPr>
+          <p:cNvPr id="3" name="內容版面配置區 2">
+            <a:extLst>
+              <a:ext uri="{FF2B5EF4-FFF2-40B4-BE49-F238E27FC236}">
+                <a16:creationId xmlns:a16="http://schemas.microsoft.com/office/drawing/2014/main" id="{EB8CFB42-DAE8-4C2A-9A04-F2EC9D2BFAB1}"/>
+              </a:ext>
+            </a:extLst>
+          </p:cNvPr>
+          <p:cNvSpPr>
+            <a:spLocks noGrp="1"/>
+          </p:cNvSpPr>
+          <p:nvPr>
+            <p:ph idx="1"/>
+          </p:nvPr>
+        </p:nvSpPr>
+        <p:spPr/>
+        <p:txBody>
+          <a:bodyPr/>
+          <a:lstStyle/>
+          <a:p>
+            <a:r>
+              <a:rPr lang="zh-TW" altLang="en-US" sz="2400" dirty="0"/>
+              <a:t>過去雖然偶爾會使用一些資料處理的方法，但所處理的數據通常都已經提供了明確的特徵關係，例如</a:t>
+            </a:r>
+            <a:r>
+              <a:rPr lang="en-US" altLang="zh-TW" sz="2400" dirty="0"/>
+              <a:t>:</a:t>
+            </a:r>
+            <a:r>
+              <a:rPr lang="zh-TW" altLang="en-US" sz="2400" dirty="0"/>
+              <a:t>這張照片對應的身分特徵以及年齡等型式。從未有過像是</a:t>
+            </a:r>
+            <a:r>
+              <a:rPr lang="en-US" altLang="zh-TW" sz="2400" dirty="0"/>
+              <a:t>KDDCUP2019</a:t>
+            </a:r>
+            <a:r>
+              <a:rPr lang="zh-TW" altLang="en-US" sz="2400" dirty="0"/>
+              <a:t>所提供幾乎未知的特徵資訊，這讓我們在分析資料的初期就遇到了困難，因此在期中報告時，結果不盡理想。</a:t>
+            </a:r>
+            <a:endParaRPr lang="en-US" altLang="zh-TW" sz="2400" dirty="0"/>
+          </a:p>
+          <a:p>
+            <a:r>
+              <a:rPr lang="zh-TW" altLang="en-US" sz="2400" dirty="0"/>
+              <a:t>但藉由在課堂上大家互相分享如何對未知資料進行分析以及正規化的經驗，我們也逐漸地可以透過已知資料的分布性質而對未知資料的特徵資訊進行處理，並且做出有效的特徵分析，此外也嘗試不同的演算法來改進我們的模型，最後的成績也相較於期中的成績有顯著的提升。</a:t>
+            </a:r>
+            <a:endParaRPr lang="en-US" altLang="zh-TW" sz="2400" dirty="0"/>
+          </a:p>
+          <a:p>
+            <a:r>
+              <a:rPr lang="zh-TW" altLang="en-US" sz="2400" dirty="0"/>
+              <a:t>透過這次的比賽，讓我們獲得許多在資料處理上的經驗，了解在特徵分析上，需要非常明白特徵間的關聯性及背景，才能有效的對特徵進行分析。</a:t>
+            </a:r>
+            <a:endParaRPr lang="en-US" altLang="zh-TW" sz="2400" dirty="0"/>
+          </a:p>
+        </p:txBody>
+      </p:sp>
+    </p:spTree>
+    <p:extLst>
+      <p:ext uri="{BB962C8B-B14F-4D97-AF65-F5344CB8AC3E}">
+        <p14:creationId xmlns:p14="http://schemas.microsoft.com/office/powerpoint/2010/main" val="665021306"/>
+      </p:ext>
+    </p:extLst>
+  </p:cSld>
+  <p:clrMapOvr>
+    <a:masterClrMapping/>
+  </p:clrMapOvr>
 </p:sld>
 </file>
 

</xml_diff>